<commit_message>
New version of waterfall image
</commit_message>
<xml_diff>
--- a/images/waterfall.pptx
+++ b/images/waterfall.pptx
@@ -8879,8 +8879,8 @@
         </p:blipFill>
         <p:spPr bwMode="auto">
           <a:xfrm>
-            <a:off x="213447" y="404664"/>
-            <a:ext cx="8712968" cy="6214682"/>
+            <a:off x="0" y="363261"/>
+            <a:ext cx="9144000" cy="6522123"/>
           </a:xfrm>
           <a:prstGeom prst="rect">
             <a:avLst/>
@@ -8918,7 +8918,7 @@
         </p:nvSpPr>
         <p:spPr>
           <a:xfrm>
-            <a:off x="1763688" y="116632"/>
+            <a:off x="1763688" y="230426"/>
             <a:ext cx="3024336" cy="864096"/>
           </a:xfrm>
           <a:prstGeom prst="wedgeRoundRectCallout">
@@ -9303,13 +9303,13 @@
         </p:nvSpPr>
         <p:spPr>
           <a:xfrm>
-            <a:off x="4621314" y="1268760"/>
-            <a:ext cx="3024336" cy="864096"/>
+            <a:off x="4067944" y="1221706"/>
+            <a:ext cx="2376264" cy="376872"/>
           </a:xfrm>
           <a:prstGeom prst="wedgeRoundRectCallout">
             <a:avLst>
-              <a:gd name="adj1" fmla="val -62797"/>
-              <a:gd name="adj2" fmla="val 21938"/>
+              <a:gd name="adj1" fmla="val 36017"/>
+              <a:gd name="adj2" fmla="val -109261"/>
               <a:gd name="adj3" fmla="val 16667"/>
             </a:avLst>
           </a:prstGeom>
@@ -9342,7 +9342,7 @@
                   <a:schemeClr val="tx1"/>
                 </a:solidFill>
               </a:rPr>
-              <a:t>Control </a:t>
+              <a:t>Filter </a:t>
             </a:r>
             <a:r>
               <a:rPr lang="de-DE" sz="1200" dirty="0" err="1" smtClean="0">
@@ -9358,7 +9358,7 @@
                   <a:schemeClr val="tx1"/>
                 </a:solidFill>
               </a:rPr>
-              <a:t> time span </a:t>
+              <a:t> </a:t>
             </a:r>
             <a:r>
               <a:rPr lang="de-DE" sz="1200" dirty="0" err="1" smtClean="0">
@@ -9366,7 +9366,7 @@
                   <a:schemeClr val="tx1"/>
                 </a:solidFill>
               </a:rPr>
-              <a:t>of</a:t>
+              <a:t>ressources</a:t>
             </a:r>
             <a:r>
               <a:rPr lang="de-DE" sz="1200" dirty="0" smtClean="0">
@@ -9382,7 +9382,7 @@
                   <a:schemeClr val="tx1"/>
                 </a:solidFill>
               </a:rPr>
-              <a:t>the</a:t>
+              <a:t>by</a:t>
             </a:r>
             <a:r>
               <a:rPr lang="de-DE" sz="1200" dirty="0" smtClean="0">
@@ -9398,7 +9398,7 @@
                   <a:schemeClr val="tx1"/>
                 </a:solidFill>
               </a:rPr>
-              <a:t>resources</a:t>
+              <a:t>the</a:t>
             </a:r>
             <a:r>
               <a:rPr lang="de-DE" sz="1200" dirty="0" smtClean="0">
@@ -9414,7 +9414,72 @@
                   <a:schemeClr val="tx1"/>
                 </a:solidFill>
               </a:rPr>
-              <a:t>you</a:t>
+              <a:t>url</a:t>
+            </a:r>
+            <a:endParaRPr lang="de-DE" sz="1200" dirty="0" smtClean="0">
+              <a:solidFill>
+                <a:schemeClr val="tx1"/>
+              </a:solidFill>
+            </a:endParaRPr>
+          </a:p>
+        </p:txBody>
+      </p:sp>
+      <p:sp>
+        <p:nvSpPr>
+          <p:cNvPr id="13" name="Abgerundete rechteckige Legende 12"/>
+          <p:cNvSpPr/>
+          <p:nvPr/>
+        </p:nvSpPr>
+        <p:spPr>
+          <a:xfrm>
+            <a:off x="6588224" y="1221706"/>
+            <a:ext cx="2376264" cy="376872"/>
+          </a:xfrm>
+          <a:prstGeom prst="wedgeRoundRectCallout">
+            <a:avLst>
+              <a:gd name="adj1" fmla="val 24206"/>
+              <a:gd name="adj2" fmla="val -102054"/>
+              <a:gd name="adj3" fmla="val 16667"/>
+            </a:avLst>
+          </a:prstGeom>
+          <a:ln/>
+        </p:spPr>
+        <p:style>
+          <a:lnRef idx="2">
+            <a:schemeClr val="accent2">
+              <a:shade val="50000"/>
+            </a:schemeClr>
+          </a:lnRef>
+          <a:fillRef idx="1">
+            <a:schemeClr val="accent2"/>
+          </a:fillRef>
+          <a:effectRef idx="0">
+            <a:schemeClr val="accent2"/>
+          </a:effectRef>
+          <a:fontRef idx="minor">
+            <a:schemeClr val="lt1"/>
+          </a:fontRef>
+        </p:style>
+        <p:txBody>
+          <a:bodyPr lIns="72000" rIns="72000" rtlCol="0" anchor="ctr"/>
+          <a:lstStyle/>
+          <a:p>
+            <a:pPr algn="ctr"/>
+            <a:r>
+              <a:rPr lang="de-DE" sz="1200" dirty="0" smtClean="0">
+                <a:solidFill>
+                  <a:schemeClr val="tx1"/>
+                </a:solidFill>
+              </a:rPr>
+              <a:t>Filter </a:t>
+            </a:r>
+            <a:r>
+              <a:rPr lang="de-DE" sz="1200" dirty="0" err="1" smtClean="0">
+                <a:solidFill>
+                  <a:schemeClr val="tx1"/>
+                </a:solidFill>
+              </a:rPr>
+              <a:t>the</a:t>
             </a:r>
             <a:r>
               <a:rPr lang="de-DE" sz="1200" dirty="0" smtClean="0">
@@ -9430,7 +9495,7 @@
                   <a:schemeClr val="tx1"/>
                 </a:solidFill>
               </a:rPr>
-              <a:t>want</a:t>
+              <a:t>ressources</a:t>
             </a:r>
             <a:r>
               <a:rPr lang="de-DE" sz="1200" dirty="0" smtClean="0">
@@ -9446,7 +9511,7 @@
                   <a:schemeClr val="tx1"/>
                 </a:solidFill>
               </a:rPr>
-              <a:t>to</a:t>
+              <a:t>by</a:t>
             </a:r>
             <a:r>
               <a:rPr lang="de-DE" sz="1200" dirty="0" smtClean="0">
@@ -9454,223 +9519,7 @@
                   <a:schemeClr val="tx1"/>
                 </a:solidFill>
               </a:rPr>
-              <a:t> </a:t>
-            </a:r>
-            <a:r>
-              <a:rPr lang="de-DE" sz="1200" dirty="0" err="1" smtClean="0">
-                <a:solidFill>
-                  <a:schemeClr val="tx1"/>
-                </a:solidFill>
-              </a:rPr>
-              <a:t>show</a:t>
-            </a:r>
-            <a:r>
-              <a:rPr lang="de-DE" sz="1200" dirty="0" smtClean="0">
-                <a:solidFill>
-                  <a:schemeClr val="tx1"/>
-                </a:solidFill>
-              </a:rPr>
-              <a:t>. Will </a:t>
-            </a:r>
-            <a:r>
-              <a:rPr lang="de-DE" sz="1200" dirty="0" err="1" smtClean="0">
-                <a:solidFill>
-                  <a:schemeClr val="tx1"/>
-                </a:solidFill>
-              </a:rPr>
-              <a:t>be</a:t>
-            </a:r>
-            <a:r>
-              <a:rPr lang="de-DE" sz="1200" dirty="0" smtClean="0">
-                <a:solidFill>
-                  <a:schemeClr val="tx1"/>
-                </a:solidFill>
-              </a:rPr>
-              <a:t> </a:t>
-            </a:r>
-            <a:r>
-              <a:rPr lang="de-DE" sz="1200" dirty="0" err="1" smtClean="0">
-                <a:solidFill>
-                  <a:schemeClr val="tx1"/>
-                </a:solidFill>
-              </a:rPr>
-              <a:t>pre-filled</a:t>
-            </a:r>
-            <a:r>
-              <a:rPr lang="de-DE" sz="1200" dirty="0" smtClean="0">
-                <a:solidFill>
-                  <a:schemeClr val="tx1"/>
-                </a:solidFill>
-              </a:rPr>
-              <a:t> </a:t>
-            </a:r>
-            <a:r>
-              <a:rPr lang="de-DE" sz="1200" dirty="0" err="1" smtClean="0">
-                <a:solidFill>
-                  <a:schemeClr val="tx1"/>
-                </a:solidFill>
-              </a:rPr>
-              <a:t>with</a:t>
-            </a:r>
-            <a:r>
-              <a:rPr lang="de-DE" sz="1200" dirty="0" smtClean="0">
-                <a:solidFill>
-                  <a:schemeClr val="tx1"/>
-                </a:solidFill>
-              </a:rPr>
-              <a:t> </a:t>
-            </a:r>
-            <a:r>
-              <a:rPr lang="de-DE" sz="1200" dirty="0" err="1" smtClean="0">
-                <a:solidFill>
-                  <a:schemeClr val="tx1"/>
-                </a:solidFill>
-              </a:rPr>
-              <a:t>the</a:t>
-            </a:r>
-            <a:r>
-              <a:rPr lang="de-DE" sz="1200" dirty="0" smtClean="0">
-                <a:solidFill>
-                  <a:schemeClr val="tx1"/>
-                </a:solidFill>
-              </a:rPr>
-              <a:t> </a:t>
-            </a:r>
-            <a:r>
-              <a:rPr lang="de-DE" sz="1200" dirty="0" err="1" smtClean="0">
-                <a:solidFill>
-                  <a:schemeClr val="tx1"/>
-                </a:solidFill>
-              </a:rPr>
-              <a:t>right</a:t>
-            </a:r>
-            <a:r>
-              <a:rPr lang="de-DE" sz="1200" dirty="0" smtClean="0">
-                <a:solidFill>
-                  <a:schemeClr val="tx1"/>
-                </a:solidFill>
-              </a:rPr>
-              <a:t> time </a:t>
-            </a:r>
-            <a:r>
-              <a:rPr lang="de-DE" sz="1200" dirty="0" err="1" smtClean="0">
-                <a:solidFill>
-                  <a:schemeClr val="tx1"/>
-                </a:solidFill>
-              </a:rPr>
-              <a:t>to</a:t>
-            </a:r>
-            <a:r>
-              <a:rPr lang="de-DE" sz="1200" dirty="0" smtClean="0">
-                <a:solidFill>
-                  <a:schemeClr val="tx1"/>
-                </a:solidFill>
-              </a:rPr>
-              <a:t> </a:t>
-            </a:r>
-            <a:r>
-              <a:rPr lang="de-DE" sz="1200" dirty="0" err="1" smtClean="0">
-                <a:solidFill>
-                  <a:schemeClr val="tx1"/>
-                </a:solidFill>
-              </a:rPr>
-              <a:t>show</a:t>
-            </a:r>
-            <a:r>
-              <a:rPr lang="de-DE" sz="1200" dirty="0" smtClean="0">
-                <a:solidFill>
-                  <a:schemeClr val="tx1"/>
-                </a:solidFill>
-              </a:rPr>
-              <a:t> all </a:t>
-            </a:r>
-            <a:r>
-              <a:rPr lang="de-DE" sz="1200" dirty="0" err="1" smtClean="0">
-                <a:solidFill>
-                  <a:schemeClr val="tx1"/>
-                </a:solidFill>
-              </a:rPr>
-              <a:t>ressources</a:t>
-            </a:r>
-            <a:r>
-              <a:rPr lang="de-DE" sz="1200" dirty="0" smtClean="0">
-                <a:solidFill>
-                  <a:schemeClr val="tx1"/>
-                </a:solidFill>
-              </a:rPr>
-              <a:t> </a:t>
-            </a:r>
-            <a:r>
-              <a:rPr lang="de-DE" sz="1200" dirty="0" err="1" smtClean="0">
-                <a:solidFill>
-                  <a:schemeClr val="tx1"/>
-                </a:solidFill>
-              </a:rPr>
-              <a:t>of</a:t>
-            </a:r>
-            <a:r>
-              <a:rPr lang="de-DE" sz="1200" dirty="0" smtClean="0">
-                <a:solidFill>
-                  <a:schemeClr val="tx1"/>
-                </a:solidFill>
-              </a:rPr>
-              <a:t> </a:t>
-            </a:r>
-            <a:r>
-              <a:rPr lang="de-DE" sz="1200" dirty="0" err="1" smtClean="0">
-                <a:solidFill>
-                  <a:schemeClr val="tx1"/>
-                </a:solidFill>
-              </a:rPr>
-              <a:t>the</a:t>
-            </a:r>
-            <a:r>
-              <a:rPr lang="de-DE" sz="1200" dirty="0" smtClean="0">
-                <a:solidFill>
-                  <a:schemeClr val="tx1"/>
-                </a:solidFill>
-              </a:rPr>
-              <a:t> </a:t>
-            </a:r>
-            <a:r>
-              <a:rPr lang="de-DE" sz="1200" dirty="0" err="1" smtClean="0">
-                <a:solidFill>
-                  <a:schemeClr val="tx1"/>
-                </a:solidFill>
-              </a:rPr>
-              <a:t>first</a:t>
-            </a:r>
-            <a:r>
-              <a:rPr lang="de-DE" sz="1200" dirty="0" smtClean="0">
-                <a:solidFill>
-                  <a:schemeClr val="tx1"/>
-                </a:solidFill>
-              </a:rPr>
-              <a:t> </a:t>
-            </a:r>
-            <a:r>
-              <a:rPr lang="de-DE" sz="1200" dirty="0" err="1" smtClean="0">
-                <a:solidFill>
-                  <a:schemeClr val="tx1"/>
-                </a:solidFill>
-              </a:rPr>
-              <a:t>page</a:t>
-            </a:r>
-            <a:r>
-              <a:rPr lang="de-DE" sz="1200" dirty="0" smtClean="0">
-                <a:solidFill>
-                  <a:schemeClr val="tx1"/>
-                </a:solidFill>
-              </a:rPr>
-              <a:t> </a:t>
-            </a:r>
-            <a:r>
-              <a:rPr lang="de-DE" sz="1200" dirty="0" err="1" smtClean="0">
-                <a:solidFill>
-                  <a:schemeClr val="tx1"/>
-                </a:solidFill>
-              </a:rPr>
-              <a:t>load</a:t>
+              <a:t> type</a:t>
             </a:r>
             <a:endParaRPr lang="de-DE" sz="1200" dirty="0" smtClean="0">
               <a:solidFill>

</xml_diff>